<commit_message>
presentations for html5 ug and asp.net ug
</commit_message>
<xml_diff>
--- a/2013_6_4__mobile_aspnet_mvc/opening.pptx
+++ b/2013_6_4__mobile_aspnet_mvc/opening.pptx
@@ -12,8 +12,6 @@
     <p:sldId id="263" r:id="rId6"/>
     <p:sldId id="261" r:id="rId7"/>
     <p:sldId id="262" r:id="rId8"/>
-    <p:sldId id="260" r:id="rId9"/>
-    <p:sldId id="264" r:id="rId10"/>
   </p:sldIdLst>
   <p:sldSz cx="9144000" cy="6858000" type="screen4x3"/>
   <p:notesSz cx="6858000" cy="9144000"/>
@@ -297,7 +295,7 @@
             <a:fld id="{1D8BD707-D9CF-40AE-B4C6-C98DA3205C09}" type="datetimeFigureOut">
               <a:rPr lang="en-US" smtClean="0"/>
               <a:pPr/>
-              <a:t>6/4/2013</a:t>
+              <a:t>7/10/2013</a:t>
             </a:fld>
             <a:endParaRPr lang="en-US"/>
           </a:p>
@@ -464,7 +462,7 @@
             <a:fld id="{1D8BD707-D9CF-40AE-B4C6-C98DA3205C09}" type="datetimeFigureOut">
               <a:rPr lang="en-US" smtClean="0"/>
               <a:pPr/>
-              <a:t>6/4/2013</a:t>
+              <a:t>7/10/2013</a:t>
             </a:fld>
             <a:endParaRPr lang="en-US"/>
           </a:p>
@@ -641,7 +639,7 @@
             <a:fld id="{1D8BD707-D9CF-40AE-B4C6-C98DA3205C09}" type="datetimeFigureOut">
               <a:rPr lang="en-US" smtClean="0"/>
               <a:pPr/>
-              <a:t>6/4/2013</a:t>
+              <a:t>7/10/2013</a:t>
             </a:fld>
             <a:endParaRPr lang="en-US"/>
           </a:p>
@@ -808,7 +806,7 @@
             <a:fld id="{1D8BD707-D9CF-40AE-B4C6-C98DA3205C09}" type="datetimeFigureOut">
               <a:rPr lang="en-US" smtClean="0"/>
               <a:pPr/>
-              <a:t>6/4/2013</a:t>
+              <a:t>7/10/2013</a:t>
             </a:fld>
             <a:endParaRPr lang="en-US"/>
           </a:p>
@@ -1051,7 +1049,7 @@
             <a:fld id="{1D8BD707-D9CF-40AE-B4C6-C98DA3205C09}" type="datetimeFigureOut">
               <a:rPr lang="en-US" smtClean="0"/>
               <a:pPr/>
-              <a:t>6/4/2013</a:t>
+              <a:t>7/10/2013</a:t>
             </a:fld>
             <a:endParaRPr lang="en-US"/>
           </a:p>
@@ -1336,7 +1334,7 @@
             <a:fld id="{1D8BD707-D9CF-40AE-B4C6-C98DA3205C09}" type="datetimeFigureOut">
               <a:rPr lang="en-US" smtClean="0"/>
               <a:pPr/>
-              <a:t>6/4/2013</a:t>
+              <a:t>7/10/2013</a:t>
             </a:fld>
             <a:endParaRPr lang="en-US"/>
           </a:p>
@@ -1755,7 +1753,7 @@
             <a:fld id="{1D8BD707-D9CF-40AE-B4C6-C98DA3205C09}" type="datetimeFigureOut">
               <a:rPr lang="en-US" smtClean="0"/>
               <a:pPr/>
-              <a:t>6/4/2013</a:t>
+              <a:t>7/10/2013</a:t>
             </a:fld>
             <a:endParaRPr lang="en-US"/>
           </a:p>
@@ -1870,7 +1868,7 @@
             <a:fld id="{1D8BD707-D9CF-40AE-B4C6-C98DA3205C09}" type="datetimeFigureOut">
               <a:rPr lang="en-US" smtClean="0"/>
               <a:pPr/>
-              <a:t>6/4/2013</a:t>
+              <a:t>7/10/2013</a:t>
             </a:fld>
             <a:endParaRPr lang="en-US"/>
           </a:p>
@@ -1962,7 +1960,7 @@
             <a:fld id="{1D8BD707-D9CF-40AE-B4C6-C98DA3205C09}" type="datetimeFigureOut">
               <a:rPr lang="en-US" smtClean="0"/>
               <a:pPr/>
-              <a:t>6/4/2013</a:t>
+              <a:t>7/10/2013</a:t>
             </a:fld>
             <a:endParaRPr lang="en-US"/>
           </a:p>
@@ -2236,7 +2234,7 @@
             <a:fld id="{1D8BD707-D9CF-40AE-B4C6-C98DA3205C09}" type="datetimeFigureOut">
               <a:rPr lang="en-US" smtClean="0"/>
               <a:pPr/>
-              <a:t>6/4/2013</a:t>
+              <a:t>7/10/2013</a:t>
             </a:fld>
             <a:endParaRPr lang="en-US"/>
           </a:p>
@@ -2486,7 +2484,7 @@
             <a:fld id="{1D8BD707-D9CF-40AE-B4C6-C98DA3205C09}" type="datetimeFigureOut">
               <a:rPr lang="en-US" smtClean="0"/>
               <a:pPr/>
-              <a:t>6/4/2013</a:t>
+              <a:t>7/10/2013</a:t>
             </a:fld>
             <a:endParaRPr lang="en-US"/>
           </a:p>
@@ -2701,7 +2699,7 @@
             <a:fld id="{1D8BD707-D9CF-40AE-B4C6-C98DA3205C09}" type="datetimeFigureOut">
               <a:rPr lang="en-US" smtClean="0"/>
               <a:pPr/>
-              <a:t>6/4/2013</a:t>
+              <a:t>7/10/2013</a:t>
             </a:fld>
             <a:endParaRPr lang="en-US"/>
           </a:p>
@@ -4987,156 +4985,6 @@
             </p:seq>
           </p:childTnLst>
         </p:cTn>
-      </p:par>
-    </p:tnLst>
-  </p:timing>
-</p:sld>
-</file>
-
-<file path=ppt/slides/slide8.xml><?xml version="1.0" encoding="utf-8"?>
-<p:sld xmlns:a="http://schemas.openxmlformats.org/drawingml/2006/main" xmlns:r="http://schemas.openxmlformats.org/officeDocument/2006/relationships" xmlns:p="http://schemas.openxmlformats.org/presentationml/2006/main">
-  <p:cSld>
-    <p:spTree>
-      <p:nvGrpSpPr>
-        <p:cNvPr id="1" name=""/>
-        <p:cNvGrpSpPr/>
-        <p:nvPr/>
-      </p:nvGrpSpPr>
-      <p:grpSpPr>
-        <a:xfrm>
-          <a:off x="0" y="0"/>
-          <a:ext cx="0" cy="0"/>
-          <a:chOff x="0" y="0"/>
-          <a:chExt cx="0" cy="0"/>
-        </a:xfrm>
-      </p:grpSpPr>
-      <p:sp>
-        <p:nvSpPr>
-          <p:cNvPr id="2" name="Title 1"/>
-          <p:cNvSpPr>
-            <a:spLocks noGrp="1"/>
-          </p:cNvSpPr>
-          <p:nvPr>
-            <p:ph type="title"/>
-          </p:nvPr>
-        </p:nvSpPr>
-        <p:spPr/>
-        <p:txBody>
-          <a:bodyPr/>
-          <a:lstStyle/>
-          <a:p>
-            <a:endParaRPr lang="en-US" dirty="0"/>
-          </a:p>
-        </p:txBody>
-      </p:sp>
-      <p:sp>
-        <p:nvSpPr>
-          <p:cNvPr id="3" name="Content Placeholder 2"/>
-          <p:cNvSpPr>
-            <a:spLocks noGrp="1"/>
-          </p:cNvSpPr>
-          <p:nvPr>
-            <p:ph idx="1"/>
-          </p:nvPr>
-        </p:nvSpPr>
-        <p:spPr/>
-        <p:txBody>
-          <a:bodyPr/>
-          <a:lstStyle/>
-          <a:p>
-            <a:endParaRPr lang="en-US"/>
-          </a:p>
-        </p:txBody>
-      </p:sp>
-    </p:spTree>
-    <p:extLst>
-      <p:ext uri="{BB962C8B-B14F-4D97-AF65-F5344CB8AC3E}">
-        <p14:creationId xmlns:p14="http://schemas.microsoft.com/office/powerpoint/2010/main" val="3004129087"/>
-      </p:ext>
-    </p:extLst>
-  </p:cSld>
-  <p:clrMapOvr>
-    <a:masterClrMapping/>
-  </p:clrMapOvr>
-  <p:timing>
-    <p:tnLst>
-      <p:par>
-        <p:cTn id="1" dur="indefinite" restart="never" nodeType="tmRoot"/>
-      </p:par>
-    </p:tnLst>
-  </p:timing>
-</p:sld>
-</file>
-
-<file path=ppt/slides/slide9.xml><?xml version="1.0" encoding="utf-8"?>
-<p:sld xmlns:a="http://schemas.openxmlformats.org/drawingml/2006/main" xmlns:r="http://schemas.openxmlformats.org/officeDocument/2006/relationships" xmlns:p="http://schemas.openxmlformats.org/presentationml/2006/main">
-  <p:cSld>
-    <p:spTree>
-      <p:nvGrpSpPr>
-        <p:cNvPr id="1" name=""/>
-        <p:cNvGrpSpPr/>
-        <p:nvPr/>
-      </p:nvGrpSpPr>
-      <p:grpSpPr>
-        <a:xfrm>
-          <a:off x="0" y="0"/>
-          <a:ext cx="0" cy="0"/>
-          <a:chOff x="0" y="0"/>
-          <a:chExt cx="0" cy="0"/>
-        </a:xfrm>
-      </p:grpSpPr>
-      <p:sp>
-        <p:nvSpPr>
-          <p:cNvPr id="2" name="Title 1"/>
-          <p:cNvSpPr>
-            <a:spLocks noGrp="1"/>
-          </p:cNvSpPr>
-          <p:nvPr>
-            <p:ph type="title"/>
-          </p:nvPr>
-        </p:nvSpPr>
-        <p:spPr/>
-        <p:txBody>
-          <a:bodyPr/>
-          <a:lstStyle/>
-          <a:p>
-            <a:endParaRPr lang="en-US"/>
-          </a:p>
-        </p:txBody>
-      </p:sp>
-      <p:sp>
-        <p:nvSpPr>
-          <p:cNvPr id="3" name="Content Placeholder 2"/>
-          <p:cNvSpPr>
-            <a:spLocks noGrp="1"/>
-          </p:cNvSpPr>
-          <p:nvPr>
-            <p:ph idx="1"/>
-          </p:nvPr>
-        </p:nvSpPr>
-        <p:spPr/>
-        <p:txBody>
-          <a:bodyPr/>
-          <a:lstStyle/>
-          <a:p>
-            <a:endParaRPr lang="en-US"/>
-          </a:p>
-        </p:txBody>
-      </p:sp>
-    </p:spTree>
-    <p:extLst>
-      <p:ext uri="{BB962C8B-B14F-4D97-AF65-F5344CB8AC3E}">
-        <p14:creationId xmlns:p14="http://schemas.microsoft.com/office/powerpoint/2010/main" val="2781130382"/>
-      </p:ext>
-    </p:extLst>
-  </p:cSld>
-  <p:clrMapOvr>
-    <a:masterClrMapping/>
-  </p:clrMapOvr>
-  <p:timing>
-    <p:tnLst>
-      <p:par>
-        <p:cTn id="1" dur="indefinite" restart="never" nodeType="tmRoot"/>
       </p:par>
     </p:tnLst>
   </p:timing>

</xml_diff>